<commit_message>
View adjustment and presentation
</commit_message>
<xml_diff>
--- a/Presentation.pptx
+++ b/Presentation.pptx
@@ -5,10 +5,10 @@
     <p:sldMasterId id="2147483648" r:id="rId1"/>
   </p:sldMasterIdLst>
   <p:notesMasterIdLst>
-    <p:notesMasterId r:id="rId18"/>
+    <p:notesMasterId r:id="rId21"/>
   </p:notesMasterIdLst>
   <p:handoutMasterIdLst>
-    <p:handoutMasterId r:id="rId19"/>
+    <p:handoutMasterId r:id="rId22"/>
   </p:handoutMasterIdLst>
   <p:sldIdLst>
     <p:sldId id="256" r:id="rId2"/>
@@ -25,8 +25,11 @@
     <p:sldId id="279" r:id="rId13"/>
     <p:sldId id="274" r:id="rId14"/>
     <p:sldId id="275" r:id="rId15"/>
-    <p:sldId id="276" r:id="rId16"/>
-    <p:sldId id="277" r:id="rId17"/>
+    <p:sldId id="282" r:id="rId16"/>
+    <p:sldId id="281" r:id="rId17"/>
+    <p:sldId id="276" r:id="rId18"/>
+    <p:sldId id="277" r:id="rId19"/>
+    <p:sldId id="283" r:id="rId20"/>
   </p:sldIdLst>
   <p:sldSz cx="9144000" cy="6858000" type="screen4x3"/>
   <p:notesSz cx="6858000" cy="9144000"/>
@@ -11942,21 +11945,21 @@
             <a:pPr lvl="3"/>
             <a:r>
               <a:rPr lang="en-US" sz="1950" dirty="0" smtClean="0"/>
-              <a:t>Start traffic simulation</a:t>
+              <a:t>Start or end traffic simulation</a:t>
             </a:r>
           </a:p>
           <a:p>
             <a:pPr lvl="1"/>
             <a:r>
               <a:rPr lang="en-US" sz="2250" dirty="0" smtClean="0"/>
-              <a:t>In the code:</a:t>
+              <a:t>Change parameters:</a:t>
             </a:r>
           </a:p>
           <a:p>
             <a:pPr lvl="3"/>
             <a:r>
               <a:rPr lang="en-US" sz="1950" dirty="0" smtClean="0"/>
-              <a:t>Change experimental parameters</a:t>
+              <a:t>Number of lanes per road, max number of cars, reset all</a:t>
             </a:r>
           </a:p>
           <a:p>
@@ -11998,6 +12001,13 @@
       </p:transition>
     </mc:Fallback>
   </mc:AlternateContent>
+  <p:timing>
+    <p:tnLst>
+      <p:par>
+        <p:cTn id="1" dur="indefinite" restart="never" nodeType="tmRoot"/>
+      </p:par>
+    </p:tnLst>
+  </p:timing>
 </p:sld>
 </file>
 
@@ -12068,76 +12078,75 @@
         <p:spPr/>
         <p:txBody>
           <a:bodyPr>
-            <a:normAutofit/>
+            <a:noAutofit/>
           </a:bodyPr>
           <a:lstStyle/>
           <a:p>
             <a:r>
+              <a:rPr lang="en-US" sz="2400" dirty="0" smtClean="0"/>
+              <a:t>Car agent program:</a:t>
+            </a:r>
+          </a:p>
+          <a:p>
+            <a:pPr lvl="1"/>
+            <a:r>
               <a:rPr lang="en-US" sz="2000" dirty="0" smtClean="0"/>
-              <a:t>Car agent working:</a:t>
+              <a:t>&gt;Get percept from the road network and traffic situation</a:t>
+            </a:r>
+          </a:p>
+          <a:p>
+            <a:pPr lvl="3"/>
+            <a:r>
+              <a:rPr lang="en-US" sz="1600" dirty="0" smtClean="0"/>
+              <a:t>Current road, next road, destination, previous car</a:t>
             </a:r>
           </a:p>
           <a:p>
             <a:pPr lvl="1"/>
             <a:r>
-              <a:rPr lang="en-US" sz="1850" dirty="0" smtClean="0"/>
-              <a:t>&gt;Get percept from the road network and traffic situation</a:t>
+              <a:rPr lang="en-US" sz="2000" dirty="0" smtClean="0"/>
+              <a:t>&gt;Update its status using the percept</a:t>
             </a:r>
           </a:p>
           <a:p>
             <a:pPr lvl="3"/>
             <a:r>
-              <a:rPr lang="en-US" sz="1550" dirty="0" smtClean="0"/>
-              <a:t>Current road, next road, destination, previous car</a:t>
+              <a:rPr lang="en-US" sz="1600" dirty="0" smtClean="0"/>
+              <a:t>Traveling or reached destination or dead end</a:t>
             </a:r>
           </a:p>
           <a:p>
             <a:pPr lvl="1"/>
             <a:r>
-              <a:rPr lang="en-US" sz="1850" dirty="0" smtClean="0"/>
-              <a:t>&gt;Update its status using the percept</a:t>
+              <a:rPr lang="en-US" sz="2000" dirty="0" smtClean="0"/>
+              <a:t>&gt;Generate an action</a:t>
             </a:r>
           </a:p>
           <a:p>
             <a:pPr lvl="3"/>
             <a:r>
-              <a:rPr lang="en-US" sz="1550" dirty="0" smtClean="0"/>
-              <a:t>Traveling or reached destination or dead end</a:t>
+              <a:rPr lang="en-US" sz="1600" dirty="0" smtClean="0"/>
+              <a:t>Start moving, keep moving on the current lane; Passing an intersection; Reached destination; IDM to keep distance to other cars.</a:t>
             </a:r>
           </a:p>
           <a:p>
             <a:pPr lvl="1"/>
             <a:r>
-              <a:rPr lang="en-US" sz="1850" dirty="0" smtClean="0"/>
-              <a:t>&gt;Generate an action</a:t>
+              <a:rPr lang="en-US" sz="2000" dirty="0" smtClean="0"/>
+              <a:t>&gt;The traffic simulator decide if the action works</a:t>
             </a:r>
           </a:p>
           <a:p>
             <a:pPr lvl="3"/>
             <a:r>
-              <a:rPr lang="en-US" sz="1400" dirty="0" smtClean="0"/>
-              <a:t>Start moving, keep moving on the current lane; Passing an intersection; Reached destination; IDM to keep distance to other cars.</a:t>
-            </a:r>
-            <a:endParaRPr lang="en-US" sz="1400" dirty="0"/>
+              <a:rPr lang="en-US" sz="1600" dirty="0" smtClean="0"/>
+              <a:t>Currently all of them works</a:t>
+            </a:r>
           </a:p>
           <a:p>
             <a:pPr lvl="1"/>
             <a:r>
-              <a:rPr lang="en-US" sz="1700" dirty="0" smtClean="0"/>
-              <a:t>&gt;The traffic simulator decide if the action works</a:t>
-            </a:r>
-          </a:p>
-          <a:p>
-            <a:pPr lvl="3"/>
-            <a:r>
-              <a:rPr lang="en-US" sz="1250" dirty="0" smtClean="0"/>
-              <a:t>Currently all of them works</a:t>
-            </a:r>
-          </a:p>
-          <a:p>
-            <a:pPr lvl="1"/>
-            <a:r>
-              <a:rPr lang="en-US" sz="1550" dirty="0" smtClean="0"/>
+              <a:rPr lang="en-US" sz="2000" dirty="0" smtClean="0"/>
               <a:t>&gt;Do this update process 25 times a second.</a:t>
             </a:r>
           </a:p>
@@ -12165,6 +12174,13 @@
       </p:transition>
     </mc:Fallback>
   </mc:AlternateContent>
+  <p:timing>
+    <p:tnLst>
+      <p:par>
+        <p:cTn id="1" dur="indefinite" restart="never" nodeType="tmRoot"/>
+      </p:par>
+    </p:tnLst>
+  </p:timing>
 </p:sld>
 </file>
 
@@ -12282,31 +12298,23 @@
         </p:spPr>
         <p:txBody>
           <a:bodyPr>
-            <a:normAutofit/>
+            <a:noAutofit/>
           </a:bodyPr>
           <a:lstStyle/>
           <a:p>
             <a:pPr algn="r"/>
             <a:r>
-              <a:rPr lang="en-US" sz="3200" smtClean="0"/>
+              <a:rPr lang="en-US" sz="2800" dirty="0" smtClean="0"/>
               <a:t>Conclusion</a:t>
             </a:r>
             <a:br>
-              <a:rPr lang="en-US" sz="3200" smtClean="0"/>
+              <a:rPr lang="en-US" sz="2800" dirty="0" smtClean="0"/>
             </a:br>
             <a:r>
-              <a:rPr lang="en-US" sz="3200"/>
-              <a:t>-</a:t>
-            </a:r>
-            <a:r>
-              <a:rPr lang="en-US" sz="3200" smtClean="0"/>
-              <a:t>Flexible </a:t>
-            </a:r>
-            <a:r>
-              <a:rPr lang="en-US" sz="3200" dirty="0" smtClean="0"/>
-              <a:t>Road Network Construction</a:t>
-            </a:r>
-            <a:endParaRPr lang="en-US" sz="3200" dirty="0"/>
+              <a:rPr lang="en-US" sz="2800" dirty="0" smtClean="0"/>
+              <a:t>Metro -Flexible Road Network Construction</a:t>
+            </a:r>
+            <a:endParaRPr lang="en-US" sz="2800" dirty="0"/>
           </a:p>
         </p:txBody>
       </p:sp>
@@ -12399,26 +12407,42 @@
             <p:ph type="title"/>
           </p:nvPr>
         </p:nvSpPr>
-        <p:spPr/>
+        <p:spPr>
+          <a:xfrm>
+            <a:off x="228600" y="365126"/>
+            <a:ext cx="8610600" cy="1145224"/>
+          </a:xfrm>
+        </p:spPr>
         <p:txBody>
           <a:bodyPr>
-            <a:normAutofit/>
+            <a:noAutofit/>
           </a:bodyPr>
           <a:lstStyle/>
           <a:p>
             <a:pPr algn="r"/>
             <a:r>
-              <a:rPr lang="en-US" sz="3200" dirty="0" smtClean="0"/>
+              <a:rPr lang="en-US" sz="2800"/>
               <a:t>Conclusion</a:t>
             </a:r>
+            <a:r>
+              <a:rPr lang="en-US" sz="2800"/>
+              <a:t/>
+            </a:r>
             <a:br>
-              <a:rPr lang="en-US" sz="3200" dirty="0" smtClean="0"/>
+              <a:rPr lang="en-US" sz="2800"/>
             </a:br>
             <a:r>
-              <a:rPr lang="en-US" sz="3200" dirty="0" smtClean="0"/>
-              <a:t>-Showing statistic results</a:t>
-            </a:r>
-            <a:endParaRPr lang="en-US" sz="3200" dirty="0"/>
+              <a:rPr lang="en-US" altLang="zh-CN" sz="2800" smtClean="0"/>
+              <a:t>Interchange</a:t>
+            </a:r>
+            <a:r>
+              <a:rPr lang="en-US" sz="2800" smtClean="0"/>
+              <a:t> - Flexible </a:t>
+            </a:r>
+            <a:r>
+              <a:rPr lang="en-US" sz="2800"/>
+              <a:t>Road Network Construction</a:t>
+            </a:r>
           </a:p>
         </p:txBody>
       </p:sp>
@@ -12444,14 +12468,203 @@
         </p:blipFill>
         <p:spPr>
           <a:xfrm>
-            <a:off x="5410200" y="1828800"/>
-            <a:ext cx="3378200" cy="4152900"/>
+            <a:off x="1541540" y="1676400"/>
+            <a:ext cx="5984720" cy="4595528"/>
           </a:xfrm>
           <a:prstGeom prst="rect">
             <a:avLst/>
           </a:prstGeom>
         </p:spPr>
       </p:pic>
+    </p:spTree>
+    <p:extLst>
+      <p:ext uri="{BB962C8B-B14F-4D97-AF65-F5344CB8AC3E}">
+        <p14:creationId xmlns:p14="http://schemas.microsoft.com/office/powerpoint/2010/main" val="1133709828"/>
+      </p:ext>
+    </p:extLst>
+  </p:cSld>
+  <p:clrMapOvr>
+    <a:masterClrMapping/>
+  </p:clrMapOvr>
+  <mc:AlternateContent xmlns:mc="http://schemas.openxmlformats.org/markup-compatibility/2006" xmlns:p14="http://schemas.microsoft.com/office/powerpoint/2010/main">
+    <mc:Choice Requires="p14">
+      <p:transition spd="med" p14:dur="700">
+        <p:fade/>
+      </p:transition>
+    </mc:Choice>
+    <mc:Fallback xmlns="">
+      <p:transition spd="med">
+        <p:fade/>
+      </p:transition>
+    </mc:Fallback>
+  </mc:AlternateContent>
+</p:sld>
+</file>
+
+<file path=ppt/slides/slide16.xml><?xml version="1.0" encoding="utf-8"?>
+<p:sld xmlns:a="http://schemas.openxmlformats.org/drawingml/2006/main" xmlns:r="http://schemas.openxmlformats.org/officeDocument/2006/relationships" xmlns:p="http://schemas.openxmlformats.org/presentationml/2006/main">
+  <p:cSld>
+    <p:spTree>
+      <p:nvGrpSpPr>
+        <p:cNvPr id="1" name=""/>
+        <p:cNvGrpSpPr/>
+        <p:nvPr/>
+      </p:nvGrpSpPr>
+      <p:grpSpPr>
+        <a:xfrm>
+          <a:off x="0" y="0"/>
+          <a:ext cx="0" cy="0"/>
+          <a:chOff x="0" y="0"/>
+          <a:chExt cx="0" cy="0"/>
+        </a:xfrm>
+      </p:grpSpPr>
+      <p:sp>
+        <p:nvSpPr>
+          <p:cNvPr id="2" name="Title 1"/>
+          <p:cNvSpPr>
+            <a:spLocks noGrp="1"/>
+          </p:cNvSpPr>
+          <p:nvPr>
+            <p:ph type="title"/>
+          </p:nvPr>
+        </p:nvSpPr>
+        <p:spPr>
+          <a:xfrm>
+            <a:off x="381000" y="365126"/>
+            <a:ext cx="8305800" cy="1145224"/>
+          </a:xfrm>
+        </p:spPr>
+        <p:txBody>
+          <a:bodyPr>
+            <a:noAutofit/>
+          </a:bodyPr>
+          <a:lstStyle/>
+          <a:p>
+            <a:pPr algn="r"/>
+            <a:r>
+              <a:rPr lang="en-US" sz="2800" dirty="0"/>
+              <a:t>Conclusion</a:t>
+            </a:r>
+            <a:br>
+              <a:rPr lang="en-US" sz="2800" dirty="0"/>
+            </a:br>
+            <a:r>
+              <a:rPr lang="en-US" sz="2800" dirty="0" smtClean="0"/>
+              <a:t>Any shape - Flexible </a:t>
+            </a:r>
+            <a:r>
+              <a:rPr lang="en-US" sz="2800" dirty="0"/>
+              <a:t>Road Network Construction</a:t>
+            </a:r>
+            <a:endParaRPr lang="en-US" sz="2400" dirty="0"/>
+          </a:p>
+        </p:txBody>
+      </p:sp>
+      <p:pic>
+        <p:nvPicPr>
+          <p:cNvPr id="4" name="Picture 3"/>
+          <p:cNvPicPr>
+            <a:picLocks noChangeAspect="1"/>
+          </p:cNvPicPr>
+          <p:nvPr/>
+        </p:nvPicPr>
+        <p:blipFill>
+          <a:blip r:embed="rId2">
+            <a:extLst>
+              <a:ext uri="{28A0092B-C50C-407E-A947-70E740481C1C}">
+                <a14:useLocalDpi xmlns:a14="http://schemas.microsoft.com/office/drawing/2010/main" val="0"/>
+              </a:ext>
+            </a:extLst>
+          </a:blip>
+          <a:stretch>
+            <a:fillRect/>
+          </a:stretch>
+        </p:blipFill>
+        <p:spPr>
+          <a:xfrm>
+            <a:off x="643434" y="1676399"/>
+            <a:ext cx="7871915" cy="4794537"/>
+          </a:xfrm>
+          <a:prstGeom prst="rect">
+            <a:avLst/>
+          </a:prstGeom>
+        </p:spPr>
+      </p:pic>
+    </p:spTree>
+    <p:extLst>
+      <p:ext uri="{BB962C8B-B14F-4D97-AF65-F5344CB8AC3E}">
+        <p14:creationId xmlns:p14="http://schemas.microsoft.com/office/powerpoint/2010/main" val="1246834148"/>
+      </p:ext>
+    </p:extLst>
+  </p:cSld>
+  <p:clrMapOvr>
+    <a:masterClrMapping/>
+  </p:clrMapOvr>
+  <mc:AlternateContent xmlns:mc="http://schemas.openxmlformats.org/markup-compatibility/2006" xmlns:p14="http://schemas.microsoft.com/office/powerpoint/2010/main">
+    <mc:Choice Requires="p14">
+      <p:transition spd="med" p14:dur="700">
+        <p:fade/>
+      </p:transition>
+    </mc:Choice>
+    <mc:Fallback xmlns="">
+      <p:transition spd="med">
+        <p:fade/>
+      </p:transition>
+    </mc:Fallback>
+  </mc:AlternateContent>
+</p:sld>
+</file>
+
+<file path=ppt/slides/slide17.xml><?xml version="1.0" encoding="utf-8"?>
+<p:sld xmlns:a="http://schemas.openxmlformats.org/drawingml/2006/main" xmlns:r="http://schemas.openxmlformats.org/officeDocument/2006/relationships" xmlns:p="http://schemas.openxmlformats.org/presentationml/2006/main">
+  <p:cSld>
+    <p:spTree>
+      <p:nvGrpSpPr>
+        <p:cNvPr id="1" name=""/>
+        <p:cNvGrpSpPr/>
+        <p:nvPr/>
+      </p:nvGrpSpPr>
+      <p:grpSpPr>
+        <a:xfrm>
+          <a:off x="0" y="0"/>
+          <a:ext cx="0" cy="0"/>
+          <a:chOff x="0" y="0"/>
+          <a:chExt cx="0" cy="0"/>
+        </a:xfrm>
+      </p:grpSpPr>
+      <p:sp>
+        <p:nvSpPr>
+          <p:cNvPr id="2" name="Title 1"/>
+          <p:cNvSpPr>
+            <a:spLocks noGrp="1"/>
+          </p:cNvSpPr>
+          <p:nvPr>
+            <p:ph type="title"/>
+          </p:nvPr>
+        </p:nvSpPr>
+        <p:spPr/>
+        <p:txBody>
+          <a:bodyPr>
+            <a:normAutofit/>
+          </a:bodyPr>
+          <a:lstStyle/>
+          <a:p>
+            <a:pPr algn="r"/>
+            <a:r>
+              <a:rPr lang="en-US" sz="3200" dirty="0" smtClean="0"/>
+              <a:t>Conclusion</a:t>
+            </a:r>
+            <a:br>
+              <a:rPr lang="en-US" sz="3200" dirty="0" smtClean="0"/>
+            </a:br>
+            <a:r>
+              <a:rPr lang="en-US" sz="3200" dirty="0" smtClean="0"/>
+              <a:t>-Showing statistic results</a:t>
+            </a:r>
+            <a:endParaRPr lang="en-US" sz="3200" dirty="0"/>
+          </a:p>
+        </p:txBody>
+      </p:sp>
       <p:pic>
         <p:nvPicPr>
           <p:cNvPr id="5" name="Picture 4"/>
@@ -12461,7 +12674,7 @@
           <p:nvPr/>
         </p:nvPicPr>
         <p:blipFill>
-          <a:blip r:embed="rId3">
+          <a:blip r:embed="rId2">
             <a:extLst>
               <a:ext uri="{28A0092B-C50C-407E-A947-70E740481C1C}">
                 <a14:useLocalDpi xmlns:a14="http://schemas.microsoft.com/office/drawing/2010/main" val="0"/>
@@ -12476,6 +12689,35 @@
           <a:xfrm>
             <a:off x="457200" y="1828800"/>
             <a:ext cx="4648200" cy="4161336"/>
+          </a:xfrm>
+          <a:prstGeom prst="rect">
+            <a:avLst/>
+          </a:prstGeom>
+        </p:spPr>
+      </p:pic>
+      <p:pic>
+        <p:nvPicPr>
+          <p:cNvPr id="6" name="Picture 5"/>
+          <p:cNvPicPr>
+            <a:picLocks noChangeAspect="1"/>
+          </p:cNvPicPr>
+          <p:nvPr/>
+        </p:nvPicPr>
+        <p:blipFill rotWithShape="1">
+          <a:blip r:embed="rId3">
+            <a:extLst>
+              <a:ext uri="{28A0092B-C50C-407E-A947-70E740481C1C}">
+                <a14:useLocalDpi xmlns:a14="http://schemas.microsoft.com/office/drawing/2010/main" val="0"/>
+              </a:ext>
+            </a:extLst>
+          </a:blip>
+          <a:srcRect r="27534" b="29740"/>
+          <a:stretch/>
+        </p:blipFill>
+        <p:spPr>
+          <a:xfrm>
+            <a:off x="4953000" y="1828801"/>
+            <a:ext cx="3660004" cy="4161336"/>
           </a:xfrm>
           <a:prstGeom prst="rect">
             <a:avLst/>
@@ -12514,7 +12756,7 @@
 </p:sld>
 </file>
 
-<file path=ppt/slides/slide16.xml><?xml version="1.0" encoding="utf-8"?>
+<file path=ppt/slides/slide18.xml><?xml version="1.0" encoding="utf-8"?>
 <p:sld xmlns:a="http://schemas.openxmlformats.org/drawingml/2006/main" xmlns:r="http://schemas.openxmlformats.org/officeDocument/2006/relationships" xmlns:p="http://schemas.openxmlformats.org/presentationml/2006/main">
   <p:cSld>
     <p:spTree>
@@ -12601,28 +12843,76 @@
             <a:pPr lvl="1"/>
             <a:r>
               <a:rPr lang="en-US" sz="1850" dirty="0" smtClean="0"/>
-              <a:t>For a certain traffic density, it has an optimal average speed. Traffic will slow down if they are faster, and will speed up if they are slower. </a:t>
+              <a:t>For a certain traffic density, it has an </a:t>
+            </a:r>
+            <a:r>
+              <a:rPr lang="en-US" sz="1850" dirty="0" smtClean="0">
+                <a:solidFill>
+                  <a:srgbClr val="FFC000"/>
+                </a:solidFill>
+              </a:rPr>
+              <a:t>optimal average speed</a:t>
+            </a:r>
+            <a:r>
+              <a:rPr lang="en-US" sz="1850" dirty="0" smtClean="0"/>
+              <a:t>. Traffic will slow down if they are faster, and will speed up if they are slower. </a:t>
             </a:r>
           </a:p>
           <a:p>
             <a:pPr lvl="1"/>
             <a:r>
               <a:rPr lang="en-US" sz="1850" dirty="0" smtClean="0"/>
-              <a:t>Even when traffic density is relatively low, some specific part of the traffic is significantly slower than others. This shows “Traffic jam come out of nowhere”.</a:t>
+              <a:t>Even when traffic density is relatively low, some specific </a:t>
+            </a:r>
+            <a:r>
+              <a:rPr lang="en-US" sz="1850" dirty="0" smtClean="0">
+                <a:solidFill>
+                  <a:srgbClr val="FFC000"/>
+                </a:solidFill>
+              </a:rPr>
+              <a:t>part of the traffic</a:t>
+            </a:r>
+            <a:r>
+              <a:rPr lang="en-US" sz="1850" dirty="0" smtClean="0"/>
+              <a:t> is significantly slower than others. This shows “Traffic jam come out of nowhere”.</a:t>
             </a:r>
           </a:p>
           <a:p>
             <a:pPr lvl="1"/>
             <a:r>
               <a:rPr lang="en-US" sz="1850" dirty="0" smtClean="0"/>
-              <a:t>If speed limit is infinite, it will reach this optimal speed eventually , but it fluctuate.</a:t>
+              <a:t>If speed limit is </a:t>
+            </a:r>
+            <a:r>
+              <a:rPr lang="en-US" sz="1850" dirty="0" smtClean="0">
+                <a:solidFill>
+                  <a:srgbClr val="FFC000"/>
+                </a:solidFill>
+              </a:rPr>
+              <a:t>infinite</a:t>
+            </a:r>
+            <a:r>
+              <a:rPr lang="en-US" sz="1850" dirty="0" smtClean="0"/>
+              <a:t>, it will reach this optimal speed eventually , but it fluctuate.</a:t>
             </a:r>
           </a:p>
           <a:p>
             <a:pPr lvl="1"/>
             <a:r>
               <a:rPr lang="en-US" sz="1850" dirty="0" smtClean="0"/>
-              <a:t>If speed limit is lower than the optimal average speed, all cars will reach a stable speed of the speed limit at the end.</a:t>
+              <a:t>If speed limit is </a:t>
+            </a:r>
+            <a:r>
+              <a:rPr lang="en-US" sz="1850" dirty="0" smtClean="0">
+                <a:solidFill>
+                  <a:srgbClr val="FFC000"/>
+                </a:solidFill>
+              </a:rPr>
+              <a:t>lower than the optimal </a:t>
+            </a:r>
+            <a:r>
+              <a:rPr lang="en-US" sz="1850" dirty="0" smtClean="0"/>
+              <a:t>average speed, all cars will reach a stable speed of the speed limit at the end.</a:t>
             </a:r>
             <a:endParaRPr lang="en-US" sz="1850" dirty="0"/>
           </a:p>
@@ -12632,6 +12922,154 @@
     <p:extLst>
       <p:ext uri="{BB962C8B-B14F-4D97-AF65-F5344CB8AC3E}">
         <p14:creationId xmlns:p14="http://schemas.microsoft.com/office/powerpoint/2010/main" val="573490723"/>
+      </p:ext>
+    </p:extLst>
+  </p:cSld>
+  <p:clrMapOvr>
+    <a:masterClrMapping/>
+  </p:clrMapOvr>
+  <mc:AlternateContent xmlns:mc="http://schemas.openxmlformats.org/markup-compatibility/2006" xmlns:p14="http://schemas.microsoft.com/office/powerpoint/2010/main">
+    <mc:Choice Requires="p14">
+      <p:transition spd="med" p14:dur="700">
+        <p:fade/>
+      </p:transition>
+    </mc:Choice>
+    <mc:Fallback xmlns="">
+      <p:transition spd="med">
+        <p:fade/>
+      </p:transition>
+    </mc:Fallback>
+  </mc:AlternateContent>
+  <p:timing>
+    <p:tnLst>
+      <p:par>
+        <p:cTn id="1" dur="indefinite" restart="never" nodeType="tmRoot"/>
+      </p:par>
+    </p:tnLst>
+  </p:timing>
+</p:sld>
+</file>
+
+<file path=ppt/slides/slide19.xml><?xml version="1.0" encoding="utf-8"?>
+<p:sld xmlns:a="http://schemas.openxmlformats.org/drawingml/2006/main" xmlns:r="http://schemas.openxmlformats.org/officeDocument/2006/relationships" xmlns:p="http://schemas.openxmlformats.org/presentationml/2006/main">
+  <p:cSld>
+    <p:spTree>
+      <p:nvGrpSpPr>
+        <p:cNvPr id="1" name=""/>
+        <p:cNvGrpSpPr/>
+        <p:nvPr/>
+      </p:nvGrpSpPr>
+      <p:grpSpPr>
+        <a:xfrm>
+          <a:off x="0" y="0"/>
+          <a:ext cx="0" cy="0"/>
+          <a:chOff x="0" y="0"/>
+          <a:chExt cx="0" cy="0"/>
+        </a:xfrm>
+      </p:grpSpPr>
+      <p:sp>
+        <p:nvSpPr>
+          <p:cNvPr id="2" name="Title 1"/>
+          <p:cNvSpPr>
+            <a:spLocks noGrp="1"/>
+          </p:cNvSpPr>
+          <p:nvPr>
+            <p:ph type="title"/>
+          </p:nvPr>
+        </p:nvSpPr>
+        <p:spPr/>
+        <p:txBody>
+          <a:bodyPr>
+            <a:normAutofit/>
+          </a:bodyPr>
+          <a:lstStyle/>
+          <a:p>
+            <a:pPr algn="r"/>
+            <a:r>
+              <a:rPr lang="en-US" sz="3200" smtClean="0"/>
+              <a:t>Conclusion - Further </a:t>
+            </a:r>
+            <a:r>
+              <a:rPr lang="en-US" sz="3200" dirty="0" smtClean="0"/>
+              <a:t>development</a:t>
+            </a:r>
+            <a:endParaRPr lang="en-US" sz="3200" dirty="0"/>
+          </a:p>
+        </p:txBody>
+      </p:sp>
+      <p:sp>
+        <p:nvSpPr>
+          <p:cNvPr id="3" name="Content Placeholder 2"/>
+          <p:cNvSpPr>
+            <a:spLocks noGrp="1"/>
+          </p:cNvSpPr>
+          <p:nvPr>
+            <p:ph idx="1"/>
+          </p:nvPr>
+        </p:nvSpPr>
+        <p:spPr/>
+        <p:txBody>
+          <a:bodyPr>
+            <a:normAutofit/>
+          </a:bodyPr>
+          <a:lstStyle/>
+          <a:p>
+            <a:r>
+              <a:rPr lang="en-US" sz="2000" dirty="0" smtClean="0"/>
+              <a:t>Change lanes</a:t>
+            </a:r>
+          </a:p>
+          <a:p>
+            <a:r>
+              <a:rPr lang="en-US" sz="2000" dirty="0" smtClean="0"/>
+              <a:t>Lane rules</a:t>
+            </a:r>
+          </a:p>
+          <a:p>
+            <a:pPr lvl="1"/>
+            <a:r>
+              <a:rPr lang="en-US" sz="1850" dirty="0" smtClean="0"/>
+              <a:t>Left turn only at the next intersection</a:t>
+            </a:r>
+          </a:p>
+          <a:p>
+            <a:pPr lvl="1"/>
+            <a:r>
+              <a:rPr lang="en-US" sz="1850" dirty="0" smtClean="0"/>
+              <a:t>Speed limit</a:t>
+            </a:r>
+          </a:p>
+          <a:p>
+            <a:r>
+              <a:rPr lang="en-US" sz="2000" dirty="0" smtClean="0"/>
+              <a:t>Fork and Merge</a:t>
+            </a:r>
+          </a:p>
+          <a:p>
+            <a:r>
+              <a:rPr lang="en-US" sz="2000" dirty="0" smtClean="0"/>
+              <a:t>Traffic light</a:t>
+            </a:r>
+          </a:p>
+          <a:p>
+            <a:r>
+              <a:rPr lang="en-US" sz="2000" dirty="0" smtClean="0"/>
+              <a:t>Accidents</a:t>
+            </a:r>
+          </a:p>
+          <a:p>
+            <a:r>
+              <a:rPr lang="en-US" sz="2000" dirty="0" smtClean="0"/>
+              <a:t>Traffic jam</a:t>
+            </a:r>
+            <a:endParaRPr lang="en-US" sz="2000" dirty="0"/>
+          </a:p>
+        </p:txBody>
+      </p:sp>
+    </p:spTree>
+    <p:extLst>
+      <p:ext uri="{BB962C8B-B14F-4D97-AF65-F5344CB8AC3E}">
+        <p14:creationId xmlns:p14="http://schemas.microsoft.com/office/powerpoint/2010/main" val="1684735912"/>
       </p:ext>
     </p:extLst>
   </p:cSld>
@@ -15432,6 +15870,66 @@
           </p:txBody>
         </p:sp>
       </p:grpSp>
+      <p:sp>
+        <p:nvSpPr>
+          <p:cNvPr id="62" name="TextBox 61"/>
+          <p:cNvSpPr txBox="1"/>
+          <p:nvPr/>
+        </p:nvSpPr>
+        <p:spPr>
+          <a:xfrm>
+            <a:off x="1733383" y="4216895"/>
+            <a:ext cx="800219" cy="369332"/>
+          </a:xfrm>
+          <a:prstGeom prst="rect">
+            <a:avLst/>
+          </a:prstGeom>
+          <a:noFill/>
+        </p:spPr>
+        <p:txBody>
+          <a:bodyPr wrap="none" rtlCol="0">
+            <a:spAutoFit/>
+          </a:bodyPr>
+          <a:lstStyle/>
+          <a:p>
+            <a:r>
+              <a:rPr lang="en-US" altLang="zh-CN" dirty="0" smtClean="0"/>
+              <a:t>width</a:t>
+            </a:r>
+            <a:endParaRPr lang="en-US" dirty="0"/>
+          </a:p>
+        </p:txBody>
+      </p:sp>
+      <p:sp>
+        <p:nvSpPr>
+          <p:cNvPr id="64" name="TextBox 63"/>
+          <p:cNvSpPr txBox="1"/>
+          <p:nvPr/>
+        </p:nvSpPr>
+        <p:spPr>
+          <a:xfrm>
+            <a:off x="1201538" y="3058528"/>
+            <a:ext cx="867545" cy="369332"/>
+          </a:xfrm>
+          <a:prstGeom prst="rect">
+            <a:avLst/>
+          </a:prstGeom>
+          <a:noFill/>
+        </p:spPr>
+        <p:txBody>
+          <a:bodyPr wrap="none" rtlCol="0">
+            <a:spAutoFit/>
+          </a:bodyPr>
+          <a:lstStyle/>
+          <a:p>
+            <a:r>
+              <a:rPr lang="en-US" altLang="zh-CN" dirty="0" smtClean="0"/>
+              <a:t>length</a:t>
+            </a:r>
+            <a:endParaRPr lang="en-US" dirty="0"/>
+          </a:p>
+        </p:txBody>
+      </p:sp>
     </p:spTree>
     <p:extLst>
       <p:ext uri="{BB962C8B-B14F-4D97-AF65-F5344CB8AC3E}">
@@ -15454,6 +15952,13 @@
       </p:transition>
     </mc:Fallback>
   </mc:AlternateContent>
+  <p:timing>
+    <p:tnLst>
+      <p:par>
+        <p:cTn id="1" dur="indefinite" restart="never" nodeType="tmRoot"/>
+      </p:par>
+    </p:tnLst>
+  </p:timing>
 </p:sld>
 </file>
 
@@ -18063,7 +18568,19 @@
               <a:p>
                 <a:r>
                   <a:rPr lang="en-US" sz="1800" dirty="0" smtClean="0"/>
-                  <a:t>Capture the driver’s control of speed by quantify the tendency of accelerate and brake. The driver tends to keep the same speed with the previous car and keep the minimum distance that it can follow.</a:t>
+                  <a:t>Capture the driver’s control of speed by quantify the tendency of </a:t>
+                </a:r>
+                <a:r>
+                  <a:rPr lang="en-US" sz="1800" dirty="0" smtClean="0">
+                    <a:solidFill>
+                      <a:srgbClr val="FFC000"/>
+                    </a:solidFill>
+                  </a:rPr>
+                  <a:t>accelerate and brake</a:t>
+                </a:r>
+                <a:r>
+                  <a:rPr lang="en-US" sz="1800" dirty="0" smtClean="0"/>
+                  <a:t>. The driver tends to keep the same speed with the previous car and keep the minimum distance that it can follow.</a:t>
                 </a:r>
               </a:p>
               <a:p>
@@ -18846,7 +19363,7 @@
         <p:spPr>
           <a:xfrm>
             <a:off x="280987" y="6019800"/>
-            <a:ext cx="8634413" cy="523220"/>
+            <a:ext cx="8634413" cy="461665"/>
           </a:xfrm>
           <a:prstGeom prst="rect">
             <a:avLst/>
@@ -18860,54 +19377,54 @@
           <a:lstStyle/>
           <a:p>
             <a:r>
-              <a:rPr lang="en-US" sz="1400" smtClean="0"/>
+              <a:rPr lang="en-US" sz="1200" smtClean="0"/>
               <a:t>Reference: Martin </a:t>
             </a:r>
             <a:r>
-              <a:rPr lang="en-US" sz="1400" dirty="0" err="1"/>
+              <a:rPr lang="en-US" sz="1200" dirty="0" err="1"/>
               <a:t>Treiber</a:t>
             </a:r>
             <a:r>
-              <a:rPr lang="en-US" sz="1400" dirty="0"/>
+              <a:rPr lang="en-US" sz="1200" dirty="0"/>
               <a:t>, </a:t>
             </a:r>
             <a:r>
-              <a:rPr lang="en-US" sz="1400" dirty="0" err="1"/>
+              <a:rPr lang="en-US" sz="1200" dirty="0" err="1"/>
               <a:t>Ansgar</a:t>
             </a:r>
             <a:r>
-              <a:rPr lang="en-US" sz="1400" dirty="0"/>
+              <a:rPr lang="en-US" sz="1200" dirty="0"/>
               <a:t> </a:t>
             </a:r>
             <a:r>
-              <a:rPr lang="en-US" sz="1400" dirty="0" err="1"/>
+              <a:rPr lang="en-US" sz="1200" dirty="0" err="1"/>
               <a:t>Hennecke</a:t>
             </a:r>
             <a:r>
-              <a:rPr lang="en-US" sz="1400" dirty="0"/>
+              <a:rPr lang="en-US" sz="1200" dirty="0"/>
               <a:t>, and Dirk </a:t>
             </a:r>
             <a:r>
-              <a:rPr lang="en-US" sz="1400" dirty="0" smtClean="0"/>
+              <a:rPr lang="en-US" sz="1200" dirty="0" smtClean="0"/>
               <a:t>Helbing, Congested </a:t>
             </a:r>
             <a:r>
-              <a:rPr lang="en-US" sz="1400" dirty="0"/>
+              <a:rPr lang="en-US" sz="1200" dirty="0"/>
               <a:t>Traffic States in Empirical Observations </a:t>
             </a:r>
             <a:r>
-              <a:rPr lang="en-US" sz="1400" dirty="0" smtClean="0"/>
+              <a:rPr lang="en-US" sz="1200" dirty="0" smtClean="0"/>
               <a:t>and Microscopic Simulations </a:t>
             </a:r>
             <a:r>
-              <a:rPr lang="en-US" sz="1400" dirty="0"/>
+              <a:rPr lang="en-US" sz="1200" dirty="0"/>
               <a:t>(March 18, 2014</a:t>
             </a:r>
             <a:r>
-              <a:rPr lang="en-US" sz="1400" dirty="0" smtClean="0"/>
+              <a:rPr lang="en-US" sz="1200" dirty="0" smtClean="0"/>
               <a:t>)</a:t>
             </a:r>
-            <a:endParaRPr lang="en-US" sz="1400" dirty="0"/>
+            <a:endParaRPr lang="en-US" sz="1200" dirty="0"/>
           </a:p>
         </p:txBody>
       </p:sp>

</xml_diff>